<commit_message>
Ejercicio: - JDBC, SelfContained-Transaction - JDBC, ExternalDS-NukePave
</commit_message>
<xml_diff>
--- a/Diapositivas/4. Database Testing.pptx
+++ b/Diapositivas/4. Database Testing.pptx
@@ -280,7 +280,7 @@
           <a:p>
             <a:fld id="{63D5FC4C-9EE1-4746-A368-724F618FC790}" type="datetimeFigureOut">
               <a:rPr lang="es-PE" smtClean="0"/>
-              <a:t>19/04/2013</a:t>
+              <a:t>21/04/2013</a:t>
             </a:fld>
             <a:endParaRPr lang="es-PE"/>
           </a:p>
@@ -5620,7 +5620,7 @@
             <a:fld id="{807CB568-C05F-482F-9F26-AA302B8892DF}" type="datetimeFigureOut">
               <a:rPr lang="es-ES" smtClean="0"/>
               <a:pPr/>
-              <a:t>19/04/2013</a:t>
+              <a:t>21/04/2013</a:t>
             </a:fld>
             <a:endParaRPr lang="es-ES"/>
           </a:p>
@@ -5799,7 +5799,7 @@
             <a:fld id="{807CB568-C05F-482F-9F26-AA302B8892DF}" type="datetimeFigureOut">
               <a:rPr lang="es-ES" smtClean="0"/>
               <a:pPr/>
-              <a:t>19/04/2013</a:t>
+              <a:t>21/04/2013</a:t>
             </a:fld>
             <a:endParaRPr lang="es-ES"/>
           </a:p>
@@ -5988,7 +5988,7 @@
             <a:fld id="{807CB568-C05F-482F-9F26-AA302B8892DF}" type="datetimeFigureOut">
               <a:rPr lang="es-ES" smtClean="0"/>
               <a:pPr/>
-              <a:t>19/04/2013</a:t>
+              <a:t>21/04/2013</a:t>
             </a:fld>
             <a:endParaRPr lang="es-ES"/>
           </a:p>
@@ -6167,7 +6167,7 @@
             <a:fld id="{807CB568-C05F-482F-9F26-AA302B8892DF}" type="datetimeFigureOut">
               <a:rPr lang="es-ES" smtClean="0"/>
               <a:pPr/>
-              <a:t>19/04/2013</a:t>
+              <a:t>21/04/2013</a:t>
             </a:fld>
             <a:endParaRPr lang="es-ES"/>
           </a:p>
@@ -6422,7 +6422,7 @@
             <a:fld id="{807CB568-C05F-482F-9F26-AA302B8892DF}" type="datetimeFigureOut">
               <a:rPr lang="es-ES" smtClean="0"/>
               <a:pPr/>
-              <a:t>19/04/2013</a:t>
+              <a:t>21/04/2013</a:t>
             </a:fld>
             <a:endParaRPr lang="es-ES"/>
           </a:p>
@@ -6719,7 +6719,7 @@
             <a:fld id="{807CB568-C05F-482F-9F26-AA302B8892DF}" type="datetimeFigureOut">
               <a:rPr lang="es-ES" smtClean="0"/>
               <a:pPr/>
-              <a:t>19/04/2013</a:t>
+              <a:t>21/04/2013</a:t>
             </a:fld>
             <a:endParaRPr lang="es-ES"/>
           </a:p>
@@ -7150,7 +7150,7 @@
             <a:fld id="{807CB568-C05F-482F-9F26-AA302B8892DF}" type="datetimeFigureOut">
               <a:rPr lang="es-ES" smtClean="0"/>
               <a:pPr/>
-              <a:t>19/04/2013</a:t>
+              <a:t>21/04/2013</a:t>
             </a:fld>
             <a:endParaRPr lang="es-ES"/>
           </a:p>
@@ -7277,7 +7277,7 @@
             <a:fld id="{807CB568-C05F-482F-9F26-AA302B8892DF}" type="datetimeFigureOut">
               <a:rPr lang="es-ES" smtClean="0"/>
               <a:pPr/>
-              <a:t>19/04/2013</a:t>
+              <a:t>21/04/2013</a:t>
             </a:fld>
             <a:endParaRPr lang="es-ES"/>
           </a:p>
@@ -7381,7 +7381,7 @@
             <a:fld id="{807CB568-C05F-482F-9F26-AA302B8892DF}" type="datetimeFigureOut">
               <a:rPr lang="es-ES" smtClean="0"/>
               <a:pPr/>
-              <a:t>19/04/2013</a:t>
+              <a:t>21/04/2013</a:t>
             </a:fld>
             <a:endParaRPr lang="es-ES"/>
           </a:p>
@@ -7667,7 +7667,7 @@
             <a:fld id="{807CB568-C05F-482F-9F26-AA302B8892DF}" type="datetimeFigureOut">
               <a:rPr lang="es-ES" smtClean="0"/>
               <a:pPr/>
-              <a:t>19/04/2013</a:t>
+              <a:t>21/04/2013</a:t>
             </a:fld>
             <a:endParaRPr lang="es-ES"/>
           </a:p>
@@ -7936,7 +7936,7 @@
             <a:fld id="{807CB568-C05F-482F-9F26-AA302B8892DF}" type="datetimeFigureOut">
               <a:rPr lang="es-ES" smtClean="0"/>
               <a:pPr/>
-              <a:t>19/04/2013</a:t>
+              <a:t>21/04/2013</a:t>
             </a:fld>
             <a:endParaRPr lang="es-ES"/>
           </a:p>
@@ -8187,7 +8187,7 @@
             <a:fld id="{807CB568-C05F-482F-9F26-AA302B8892DF}" type="datetimeFigureOut">
               <a:rPr lang="es-ES" smtClean="0"/>
               <a:pPr/>
-              <a:t>19/04/2013</a:t>
+              <a:t>21/04/2013</a:t>
             </a:fld>
             <a:endParaRPr lang="es-ES"/>
           </a:p>
@@ -11900,7 +11900,7 @@
             </a:pPr>
             <a:r>
               <a:rPr lang="es-PE" sz="2600" dirty="0" err="1" smtClean="0"/>
-              <a:t>NDBUnit</a:t>
+              <a:t>DBUnit</a:t>
             </a:r>
             <a:r>
               <a:rPr lang="es-PE" sz="2600" dirty="0" smtClean="0"/>
@@ -13541,7 +13541,7 @@
                   <a:srgbClr val="00823B"/>
                 </a:solidFill>
               </a:rPr>
-              <a:t>Entity</a:t>
+              <a:t>Hibernate</a:t>
             </a:r>
             <a:r>
               <a:rPr lang="es-PE" dirty="0" smtClean="0">
@@ -13549,7 +13549,7 @@
                   <a:srgbClr val="00823B"/>
                 </a:solidFill>
               </a:rPr>
-              <a:t> Framework </a:t>
+              <a:t> </a:t>
             </a:r>
             <a:r>
               <a:rPr lang="es-PE" dirty="0" err="1" smtClean="0">
@@ -13597,12 +13597,20 @@
               <a:t>Los mismos patrones de inserción y restauración de BD se aplican en el caso de </a:t>
             </a:r>
             <a:r>
+              <a:rPr lang="es-PE" sz="2600" dirty="0" err="1"/>
+              <a:t>H</a:t>
+            </a:r>
+            <a:r>
               <a:rPr lang="es-PE" sz="2600" dirty="0" err="1" smtClean="0"/>
-              <a:t>Entity</a:t>
+              <a:t>ibernate</a:t>
             </a:r>
             <a:r>
               <a:rPr lang="es-PE" sz="2600" dirty="0" smtClean="0"/>
-              <a:t> Framework y cualquier ORM.</a:t>
+              <a:t> y </a:t>
+            </a:r>
+            <a:r>
+              <a:rPr lang="es-PE" sz="2600" dirty="0" smtClean="0"/>
+              <a:t>cualquier ORM.</a:t>
             </a:r>
           </a:p>
           <a:p>

</xml_diff>